<commit_message>
Short demos and slides
</commit_message>
<xml_diff>
--- a/Slides/Week 3 - Part 2 - Validation and feedback.pptx
+++ b/Slides/Week 3 - Part 2 - Validation and feedback.pptx
@@ -3397,21 +3397,21 @@
           <a:lstStyle/>
           <a:p>
             <a:r>
-              <a:rPr lang="en-US" dirty="0" smtClean="0"/>
+              <a:rPr lang="en-US" dirty="0"/>
               <a:t>Configure dialog using classes</a:t>
             </a:r>
           </a:p>
           <a:p>
             <a:pPr lvl="1"/>
             <a:r>
-              <a:rPr lang="en-US" dirty="0" smtClean="0"/>
+              <a:rPr lang="en-US" dirty="0"/>
               <a:t>Container: modal</a:t>
             </a:r>
           </a:p>
           <a:p>
             <a:pPr lvl="2"/>
             <a:r>
-              <a:rPr lang="en-US" dirty="0" smtClean="0"/>
+              <a:rPr lang="en-US" dirty="0"/>
               <a:t>Configure dialog: modal-dialog</a:t>
             </a:r>
           </a:p>
@@ -3419,64 +3419,60 @@
             <a:pPr lvl="3"/>
             <a:r>
               <a:rPr lang="en-US" dirty="0"/>
-              <a:t>Content: </a:t>
-            </a:r>
-            <a:r>
-              <a:rPr lang="en-US" dirty="0" smtClean="0"/>
-              <a:t>modal-content</a:t>
+              <a:t>Content container: modal-content</a:t>
             </a:r>
           </a:p>
           <a:p>
             <a:pPr lvl="4"/>
             <a:r>
-              <a:rPr lang="en-US" dirty="0" smtClean="0"/>
+              <a:rPr lang="en-US" dirty="0"/>
               <a:t>Header: modal-header</a:t>
             </a:r>
           </a:p>
           <a:p>
             <a:pPr lvl="4"/>
             <a:r>
-              <a:rPr lang="en-US" dirty="0" smtClean="0"/>
-              <a:t>Content: modal-content</a:t>
+              <a:rPr lang="en-US" dirty="0"/>
+              <a:t>Content: modal-body</a:t>
             </a:r>
           </a:p>
           <a:p>
             <a:pPr lvl="4"/>
             <a:r>
-              <a:rPr lang="en-US" dirty="0" smtClean="0"/>
+              <a:rPr lang="en-US" dirty="0"/>
               <a:t>Footer: modal-footer</a:t>
             </a:r>
           </a:p>
           <a:p>
             <a:r>
-              <a:rPr lang="en-US" dirty="0" smtClean="0"/>
+              <a:rPr lang="en-US" dirty="0"/>
               <a:t>Configure launcher using classes</a:t>
             </a:r>
           </a:p>
           <a:p>
             <a:pPr lvl="1"/>
             <a:r>
-              <a:rPr lang="en-US" dirty="0" smtClean="0"/>
+              <a:rPr lang="en-US" dirty="0"/>
               <a:t>data-toggle="modal"</a:t>
             </a:r>
           </a:p>
           <a:p>
             <a:pPr lvl="1"/>
             <a:r>
-              <a:rPr lang="en-US" dirty="0" smtClean="0"/>
+              <a:rPr lang="en-US" dirty="0"/>
               <a:t>data-target="&lt;id&gt;"</a:t>
             </a:r>
           </a:p>
           <a:p>
             <a:r>
-              <a:rPr lang="en-US" dirty="0" smtClean="0"/>
+              <a:rPr lang="en-US" dirty="0"/>
               <a:t>Configure closer</a:t>
             </a:r>
           </a:p>
           <a:p>
             <a:pPr lvl="1"/>
             <a:r>
-              <a:rPr lang="en-US" dirty="0" smtClean="0"/>
+              <a:rPr lang="en-US"/>
               <a:t>data-dismiss="modal"</a:t>
             </a:r>
             <a:endParaRPr lang="en-US" dirty="0"/>
@@ -3899,6 +3895,12 @@
 </file>
 
 <file path=customXml/item1.xml><?xml version="1.0" encoding="utf-8"?>
+<p:properties xmlns:p="http://schemas.microsoft.com/office/2006/metadata/properties" xmlns:xsi="http://www.w3.org/2001/XMLSchema-instance" xmlns:pc="http://schemas.microsoft.com/office/infopath/2007/PartnerControls">
+  <documentManagement/>
+</p:properties>
+</file>
+
+<file path=customXml/item2.xml><?xml version="1.0" encoding="utf-8"?>
 <ct:contentTypeSchema xmlns:ct="http://schemas.microsoft.com/office/2006/metadata/contentType" xmlns:ma="http://schemas.microsoft.com/office/2006/metadata/properties/metaAttributes" ct:_="" ma:_="" ma:contentTypeName="Document" ma:contentTypeID="0x010100A9B9146463917044969030790F8D7E1F" ma:contentTypeVersion="1" ma:contentTypeDescription="Create a new document." ma:contentTypeScope="" ma:versionID="88cb810aac341a62f87e1e4b3de4b413">
   <xsd:schema xmlns:xsd="http://www.w3.org/2001/XMLSchema" xmlns:xs="http://www.w3.org/2001/XMLSchema" xmlns:p="http://schemas.microsoft.com/office/2006/metadata/properties" xmlns:ns3="239b4775-11ac-4188-ac69-b5b775bb2155" targetNamespace="http://schemas.microsoft.com/office/2006/metadata/properties" ma:root="true" ma:fieldsID="a6232b10dbb3dfcaf3920bb7009c4722" ns3:_="">
     <xsd:import namespace="239b4775-11ac-4188-ac69-b5b775bb2155"/>
@@ -4038,12 +4040,6 @@
 </ct:contentTypeSchema>
 </file>
 
-<file path=customXml/item2.xml><?xml version="1.0" encoding="utf-8"?>
-<p:properties xmlns:p="http://schemas.microsoft.com/office/2006/metadata/properties" xmlns:xsi="http://www.w3.org/2001/XMLSchema-instance" xmlns:pc="http://schemas.microsoft.com/office/infopath/2007/PartnerControls">
-  <documentManagement/>
-</p:properties>
-</file>
-
 <file path=customXml/item3.xml><?xml version="1.0" encoding="utf-8"?>
 <?mso-contentType ?>
 <FormTemplates xmlns="http://schemas.microsoft.com/sharepoint/v3/contenttype/forms">
@@ -4054,6 +4050,22 @@
 </file>
 
 <file path=customXml/itemProps1.xml><?xml version="1.0" encoding="utf-8"?>
+<ds:datastoreItem xmlns:ds="http://schemas.openxmlformats.org/officeDocument/2006/customXml" ds:itemID="{605C38A2-25DD-4ECF-BF7B-1D95CEE2F814}">
+  <ds:schemaRefs>
+    <ds:schemaRef ds:uri="http://schemas.microsoft.com/office/infopath/2007/PartnerControls"/>
+    <ds:schemaRef ds:uri="http://purl.org/dc/elements/1.1/"/>
+    <ds:schemaRef ds:uri="http://schemas.microsoft.com/office/2006/metadata/properties"/>
+    <ds:schemaRef ds:uri="http://schemas.microsoft.com/office/2006/documentManagement/types"/>
+    <ds:schemaRef ds:uri="http://purl.org/dc/terms/"/>
+    <ds:schemaRef ds:uri="http://schemas.openxmlformats.org/package/2006/metadata/core-properties"/>
+    <ds:schemaRef ds:uri="http://purl.org/dc/dcmitype/"/>
+    <ds:schemaRef ds:uri="239b4775-11ac-4188-ac69-b5b775bb2155"/>
+    <ds:schemaRef ds:uri="http://www.w3.org/XML/1998/namespace"/>
+  </ds:schemaRefs>
+</ds:datastoreItem>
+</file>
+
+<file path=customXml/itemProps2.xml><?xml version="1.0" encoding="utf-8"?>
 <ds:datastoreItem xmlns:ds="http://schemas.openxmlformats.org/officeDocument/2006/customXml" ds:itemID="{64076F6A-F6B4-41FD-BEBD-B0826AC555FB}">
   <ds:schemaRefs>
     <ds:schemaRef ds:uri="http://schemas.microsoft.com/office/2006/metadata/contentType"/>
@@ -4071,22 +4083,6 @@
 </ds:datastoreItem>
 </file>
 
-<file path=customXml/itemProps2.xml><?xml version="1.0" encoding="utf-8"?>
-<ds:datastoreItem xmlns:ds="http://schemas.openxmlformats.org/officeDocument/2006/customXml" ds:itemID="{605C38A2-25DD-4ECF-BF7B-1D95CEE2F814}">
-  <ds:schemaRefs>
-    <ds:schemaRef ds:uri="http://schemas.microsoft.com/office/infopath/2007/PartnerControls"/>
-    <ds:schemaRef ds:uri="http://purl.org/dc/elements/1.1/"/>
-    <ds:schemaRef ds:uri="http://schemas.microsoft.com/office/2006/metadata/properties"/>
-    <ds:schemaRef ds:uri="http://schemas.microsoft.com/office/2006/documentManagement/types"/>
-    <ds:schemaRef ds:uri="http://purl.org/dc/terms/"/>
-    <ds:schemaRef ds:uri="http://schemas.openxmlformats.org/package/2006/metadata/core-properties"/>
-    <ds:schemaRef ds:uri="http://purl.org/dc/dcmitype/"/>
-    <ds:schemaRef ds:uri="239b4775-11ac-4188-ac69-b5b775bb2155"/>
-    <ds:schemaRef ds:uri="http://www.w3.org/XML/1998/namespace"/>
-  </ds:schemaRefs>
-</ds:datastoreItem>
-</file>
-
 <file path=customXml/itemProps3.xml><?xml version="1.0" encoding="utf-8"?>
 <ds:datastoreItem xmlns:ds="http://schemas.openxmlformats.org/officeDocument/2006/customXml" ds:itemID="{90F66304-B63B-4DC3-9FE6-FB0A9E17CD06}">
   <ds:schemaRefs>

</xml_diff>